<commit_message>
Tweaked one of the graphics
</commit_message>
<xml_diff>
--- a/maintain/tutorials_multivar-stats-graphics.pptx
+++ b/maintain/tutorials_multivar-stats-graphics.pptx
@@ -105,6 +105,11 @@
       </a:defRPr>
     </a:lvl9pPr>
   </p:defaultTextStyle>
+  <p:extLst>
+    <p:ext uri="{EFAFB233-063F-42B5-8137-9DF3F51BA10A}">
+      <p15:sldGuideLst xmlns:p15="http://schemas.microsoft.com/office/powerpoint/2012/main"/>
+    </p:ext>
+  </p:extLst>
 </p:presentation>
 </file>
 
@@ -3350,7 +3355,7 @@
         </p:blipFill>
         <p:spPr>
           <a:xfrm>
-            <a:off x="128994" y="3114287"/>
+            <a:off x="128994" y="2462648"/>
             <a:ext cx="11934012" cy="2265096"/>
           </a:xfrm>
           <a:prstGeom prst="rect">

</xml_diff>

<commit_message>
Compressed tutorial images and preserved as JPG to reduce file size / repo size
</commit_message>
<xml_diff>
--- a/maintain/tutorials_multivar-stats-graphics.pptx
+++ b/maintain/tutorials_multivar-stats-graphics.pptx
@@ -5084,14 +5084,14 @@
           <p:nvPr/>
         </p:nvPicPr>
         <p:blipFill rotWithShape="1">
-          <a:blip r:embed="rId3">
+          <a:blip r:embed="rId3" cstate="print">
             <a:extLst>
               <a:ext uri="{28A0092B-C50C-407E-A947-70E740481C1C}">
-                <a14:useLocalDpi xmlns:a14="http://schemas.microsoft.com/office/drawing/2010/main" val="0"/>
+                <a14:useLocalDpi xmlns:a14="http://schemas.microsoft.com/office/drawing/2010/main"/>
               </a:ext>
             </a:extLst>
           </a:blip>
-          <a:srcRect l="5625" r="7555"/>
+          <a:srcRect/>
           <a:stretch/>
         </p:blipFill>
         <p:spPr bwMode="auto">
@@ -5220,14 +5220,14 @@
           <p:nvPr/>
         </p:nvPicPr>
         <p:blipFill rotWithShape="1">
-          <a:blip r:embed="rId3">
+          <a:blip r:embed="rId3" cstate="print">
             <a:extLst>
               <a:ext uri="{28A0092B-C50C-407E-A947-70E740481C1C}">
-                <a14:useLocalDpi xmlns:a14="http://schemas.microsoft.com/office/drawing/2010/main" val="0"/>
+                <a14:useLocalDpi xmlns:a14="http://schemas.microsoft.com/office/drawing/2010/main"/>
               </a:ext>
             </a:extLst>
           </a:blip>
-          <a:srcRect l="5625" r="7555"/>
+          <a:srcRect/>
           <a:stretch/>
         </p:blipFill>
         <p:spPr bwMode="auto">
@@ -5265,7 +5265,7 @@
           <p:nvPr/>
         </p:nvPicPr>
         <p:blipFill>
-          <a:blip r:embed="rId4">
+          <a:blip r:embed="rId4" cstate="print">
             <a:duotone>
               <a:prstClr val="black"/>
               <a:srgbClr val="D9C3A5">
@@ -5284,7 +5284,7 @@
                 </a14:imgProps>
               </a:ext>
               <a:ext uri="{28A0092B-C50C-407E-A947-70E740481C1C}">
-                <a14:useLocalDpi xmlns:a14="http://schemas.microsoft.com/office/drawing/2010/main" val="0"/>
+                <a14:useLocalDpi xmlns:a14="http://schemas.microsoft.com/office/drawing/2010/main"/>
               </a:ext>
             </a:extLst>
           </a:blip>
@@ -5389,14 +5389,14 @@
           <p:nvPr/>
         </p:nvPicPr>
         <p:blipFill rotWithShape="1">
-          <a:blip r:embed="rId6">
+          <a:blip r:embed="rId6" cstate="print">
             <a:extLst>
               <a:ext uri="{28A0092B-C50C-407E-A947-70E740481C1C}">
-                <a14:useLocalDpi xmlns:a14="http://schemas.microsoft.com/office/drawing/2010/main" val="0"/>
+                <a14:useLocalDpi xmlns:a14="http://schemas.microsoft.com/office/drawing/2010/main"/>
               </a:ext>
             </a:extLst>
           </a:blip>
-          <a:srcRect l="1820" t="8032" r="85779" b="6291"/>
+          <a:srcRect/>
           <a:stretch/>
         </p:blipFill>
         <p:spPr bwMode="auto">
@@ -5536,10 +5536,10 @@
           <p:nvPr/>
         </p:nvPicPr>
         <p:blipFill rotWithShape="1">
-          <a:blip r:embed="rId7">
+          <a:blip r:embed="rId7" cstate="print">
             <a:extLst>
               <a:ext uri="{28A0092B-C50C-407E-A947-70E740481C1C}">
-                <a14:useLocalDpi xmlns:a14="http://schemas.microsoft.com/office/drawing/2010/main" val="0"/>
+                <a14:useLocalDpi xmlns:a14="http://schemas.microsoft.com/office/drawing/2010/main"/>
               </a:ext>
             </a:extLst>
           </a:blip>
@@ -5695,10 +5695,10 @@
             <p:nvPr/>
           </p:nvPicPr>
           <p:blipFill rotWithShape="1">
-            <a:blip r:embed="rId7">
+            <a:blip r:embed="rId7" cstate="print">
               <a:extLst>
                 <a:ext uri="{28A0092B-C50C-407E-A947-70E740481C1C}">
-                  <a14:useLocalDpi xmlns:a14="http://schemas.microsoft.com/office/drawing/2010/main" val="0"/>
+                  <a14:useLocalDpi xmlns:a14="http://schemas.microsoft.com/office/drawing/2010/main"/>
                 </a:ext>
               </a:extLst>
             </a:blip>
@@ -5740,7 +5740,7 @@
             <p:nvPr/>
           </p:nvPicPr>
           <p:blipFill>
-            <a:blip r:embed="rId4">
+            <a:blip r:embed="rId4" cstate="print">
               <a:duotone>
                 <a:prstClr val="black"/>
                 <a:srgbClr val="D9C3A5">
@@ -5751,7 +5751,7 @@
               <a:extLst>
                 <a:ext uri="{BEBA8EAE-BF5A-486C-A8C5-ECC9F3942E4B}">
                   <a14:imgProps xmlns:a14="http://schemas.microsoft.com/office/drawing/2010/main">
-                    <a14:imgLayer r:embed="rId5">
+                    <a14:imgLayer r:embed="rId8">
                       <a14:imgEffect>
                         <a14:saturation sat="0"/>
                       </a14:imgEffect>
@@ -5759,7 +5759,7 @@
                   </a14:imgProps>
                 </a:ext>
                 <a:ext uri="{28A0092B-C50C-407E-A947-70E740481C1C}">
-                  <a14:useLocalDpi xmlns:a14="http://schemas.microsoft.com/office/drawing/2010/main" val="0"/>
+                  <a14:useLocalDpi xmlns:a14="http://schemas.microsoft.com/office/drawing/2010/main"/>
                 </a:ext>
               </a:extLst>
             </a:blip>
@@ -5803,14 +5803,14 @@
             <p:nvPr/>
           </p:nvPicPr>
           <p:blipFill rotWithShape="1">
-            <a:blip r:embed="rId6">
+            <a:blip r:embed="rId6" cstate="print">
               <a:extLst>
                 <a:ext uri="{28A0092B-C50C-407E-A947-70E740481C1C}">
-                  <a14:useLocalDpi xmlns:a14="http://schemas.microsoft.com/office/drawing/2010/main" val="0"/>
+                  <a14:useLocalDpi xmlns:a14="http://schemas.microsoft.com/office/drawing/2010/main"/>
                 </a:ext>
               </a:extLst>
             </a:blip>
-            <a:srcRect l="1820" t="8032" r="85779" b="6291"/>
+            <a:srcRect/>
             <a:stretch/>
           </p:blipFill>
           <p:spPr bwMode="auto">
@@ -5970,10 +5970,10 @@
             <p:nvPr/>
           </p:nvPicPr>
           <p:blipFill rotWithShape="1">
-            <a:blip r:embed="rId7">
+            <a:blip r:embed="rId7" cstate="print">
               <a:extLst>
                 <a:ext uri="{28A0092B-C50C-407E-A947-70E740481C1C}">
-                  <a14:useLocalDpi xmlns:a14="http://schemas.microsoft.com/office/drawing/2010/main" val="0"/>
+                  <a14:useLocalDpi xmlns:a14="http://schemas.microsoft.com/office/drawing/2010/main"/>
                 </a:ext>
               </a:extLst>
             </a:blip>
@@ -6015,7 +6015,7 @@
             <p:nvPr/>
           </p:nvPicPr>
           <p:blipFill>
-            <a:blip r:embed="rId4">
+            <a:blip r:embed="rId4" cstate="print">
               <a:duotone>
                 <a:prstClr val="black"/>
                 <a:srgbClr val="D9C3A5">
@@ -6026,7 +6026,7 @@
               <a:extLst>
                 <a:ext uri="{BEBA8EAE-BF5A-486C-A8C5-ECC9F3942E4B}">
                   <a14:imgProps xmlns:a14="http://schemas.microsoft.com/office/drawing/2010/main">
-                    <a14:imgLayer r:embed="rId8">
+                    <a14:imgLayer r:embed="rId9">
                       <a14:imgEffect>
                         <a14:saturation sat="0"/>
                       </a14:imgEffect>
@@ -6034,7 +6034,7 @@
                   </a14:imgProps>
                 </a:ext>
                 <a:ext uri="{28A0092B-C50C-407E-A947-70E740481C1C}">
-                  <a14:useLocalDpi xmlns:a14="http://schemas.microsoft.com/office/drawing/2010/main" val="0"/>
+                  <a14:useLocalDpi xmlns:a14="http://schemas.microsoft.com/office/drawing/2010/main"/>
                 </a:ext>
               </a:extLst>
             </a:blip>
@@ -6078,14 +6078,14 @@
             <p:nvPr/>
           </p:nvPicPr>
           <p:blipFill rotWithShape="1">
-            <a:blip r:embed="rId6">
+            <a:blip r:embed="rId6" cstate="print">
               <a:extLst>
                 <a:ext uri="{28A0092B-C50C-407E-A947-70E740481C1C}">
-                  <a14:useLocalDpi xmlns:a14="http://schemas.microsoft.com/office/drawing/2010/main" val="0"/>
+                  <a14:useLocalDpi xmlns:a14="http://schemas.microsoft.com/office/drawing/2010/main"/>
                 </a:ext>
               </a:extLst>
             </a:blip>
-            <a:srcRect l="1820" t="8032" r="85779" b="6291"/>
+            <a:srcRect/>
             <a:stretch/>
           </p:blipFill>
           <p:spPr bwMode="auto">
@@ -6178,7 +6178,7 @@
           <p:nvPr/>
         </p:nvPicPr>
         <p:blipFill>
-          <a:blip r:embed="rId4">
+          <a:blip r:embed="rId4" cstate="print">
             <a:duotone>
               <a:prstClr val="black"/>
               <a:srgbClr val="D9C3A5">
@@ -6197,7 +6197,7 @@
                 </a14:imgProps>
               </a:ext>
               <a:ext uri="{28A0092B-C50C-407E-A947-70E740481C1C}">
-                <a14:useLocalDpi xmlns:a14="http://schemas.microsoft.com/office/drawing/2010/main" val="0"/>
+                <a14:useLocalDpi xmlns:a14="http://schemas.microsoft.com/office/drawing/2010/main"/>
               </a:ext>
             </a:extLst>
           </a:blip>
@@ -6241,14 +6241,14 @@
           <p:nvPr/>
         </p:nvPicPr>
         <p:blipFill rotWithShape="1">
-          <a:blip r:embed="rId6">
+          <a:blip r:embed="rId6" cstate="print">
             <a:extLst>
               <a:ext uri="{28A0092B-C50C-407E-A947-70E740481C1C}">
-                <a14:useLocalDpi xmlns:a14="http://schemas.microsoft.com/office/drawing/2010/main" val="0"/>
+                <a14:useLocalDpi xmlns:a14="http://schemas.microsoft.com/office/drawing/2010/main"/>
               </a:ext>
             </a:extLst>
           </a:blip>
-          <a:srcRect l="1820" t="8032" r="85779" b="6291"/>
+          <a:srcRect/>
           <a:stretch/>
         </p:blipFill>
         <p:spPr bwMode="auto">
@@ -6370,14 +6370,14 @@
           <p:nvPr/>
         </p:nvPicPr>
         <p:blipFill rotWithShape="1">
-          <a:blip r:embed="rId3">
+          <a:blip r:embed="rId3" cstate="print">
             <a:extLst>
               <a:ext uri="{28A0092B-C50C-407E-A947-70E740481C1C}">
-                <a14:useLocalDpi xmlns:a14="http://schemas.microsoft.com/office/drawing/2010/main" val="0"/>
+                <a14:useLocalDpi xmlns:a14="http://schemas.microsoft.com/office/drawing/2010/main"/>
               </a:ext>
             </a:extLst>
           </a:blip>
-          <a:srcRect l="5625" r="7555"/>
+          <a:srcRect/>
           <a:stretch/>
         </p:blipFill>
         <p:spPr bwMode="auto">
@@ -6415,7 +6415,7 @@
           <p:nvPr/>
         </p:nvPicPr>
         <p:blipFill>
-          <a:blip r:embed="rId4">
+          <a:blip r:embed="rId4" cstate="print">
             <a:duotone>
               <a:prstClr val="black"/>
               <a:srgbClr val="D9C3A5">
@@ -6434,7 +6434,7 @@
                 </a14:imgProps>
               </a:ext>
               <a:ext uri="{28A0092B-C50C-407E-A947-70E740481C1C}">
-                <a14:useLocalDpi xmlns:a14="http://schemas.microsoft.com/office/drawing/2010/main" val="0"/>
+                <a14:useLocalDpi xmlns:a14="http://schemas.microsoft.com/office/drawing/2010/main"/>
               </a:ext>
             </a:extLst>
           </a:blip>
@@ -6539,14 +6539,14 @@
           <p:nvPr/>
         </p:nvPicPr>
         <p:blipFill rotWithShape="1">
-          <a:blip r:embed="rId6">
+          <a:blip r:embed="rId6" cstate="print">
             <a:extLst>
               <a:ext uri="{28A0092B-C50C-407E-A947-70E740481C1C}">
-                <a14:useLocalDpi xmlns:a14="http://schemas.microsoft.com/office/drawing/2010/main" val="0"/>
+                <a14:useLocalDpi xmlns:a14="http://schemas.microsoft.com/office/drawing/2010/main"/>
               </a:ext>
             </a:extLst>
           </a:blip>
-          <a:srcRect l="1820" t="8032" r="85779" b="6291"/>
+          <a:srcRect/>
           <a:stretch/>
         </p:blipFill>
         <p:spPr bwMode="auto">
@@ -6686,10 +6686,10 @@
           <p:nvPr/>
         </p:nvPicPr>
         <p:blipFill rotWithShape="1">
-          <a:blip r:embed="rId7">
+          <a:blip r:embed="rId7" cstate="print">
             <a:extLst>
               <a:ext uri="{28A0092B-C50C-407E-A947-70E740481C1C}">
-                <a14:useLocalDpi xmlns:a14="http://schemas.microsoft.com/office/drawing/2010/main" val="0"/>
+                <a14:useLocalDpi xmlns:a14="http://schemas.microsoft.com/office/drawing/2010/main"/>
               </a:ext>
             </a:extLst>
           </a:blip>
@@ -6731,7 +6731,7 @@
           <p:nvPr/>
         </p:nvPicPr>
         <p:blipFill>
-          <a:blip r:embed="rId4">
+          <a:blip r:embed="rId4" cstate="print">
             <a:duotone>
               <a:prstClr val="black"/>
               <a:srgbClr val="D9C3A5">
@@ -6742,7 +6742,7 @@
             <a:extLst>
               <a:ext uri="{BEBA8EAE-BF5A-486C-A8C5-ECC9F3942E4B}">
                 <a14:imgProps xmlns:a14="http://schemas.microsoft.com/office/drawing/2010/main">
-                  <a14:imgLayer r:embed="rId8">
+                  <a14:imgLayer r:embed="rId5">
                     <a14:imgEffect>
                       <a14:saturation sat="0"/>
                     </a14:imgEffect>
@@ -6750,7 +6750,7 @@
                 </a14:imgProps>
               </a:ext>
               <a:ext uri="{28A0092B-C50C-407E-A947-70E740481C1C}">
-                <a14:useLocalDpi xmlns:a14="http://schemas.microsoft.com/office/drawing/2010/main" val="0"/>
+                <a14:useLocalDpi xmlns:a14="http://schemas.microsoft.com/office/drawing/2010/main"/>
               </a:ext>
             </a:extLst>
           </a:blip>
@@ -6794,14 +6794,14 @@
           <p:nvPr/>
         </p:nvPicPr>
         <p:blipFill rotWithShape="1">
-          <a:blip r:embed="rId6">
+          <a:blip r:embed="rId6" cstate="print">
             <a:extLst>
               <a:ext uri="{28A0092B-C50C-407E-A947-70E740481C1C}">
-                <a14:useLocalDpi xmlns:a14="http://schemas.microsoft.com/office/drawing/2010/main" val="0"/>
+                <a14:useLocalDpi xmlns:a14="http://schemas.microsoft.com/office/drawing/2010/main"/>
               </a:ext>
             </a:extLst>
           </a:blip>
-          <a:srcRect l="1820" t="8032" r="85779" b="6291"/>
+          <a:srcRect/>
           <a:stretch/>
         </p:blipFill>
         <p:spPr bwMode="auto">
@@ -6961,10 +6961,10 @@
             <p:nvPr/>
           </p:nvPicPr>
           <p:blipFill rotWithShape="1">
-            <a:blip r:embed="rId7">
+            <a:blip r:embed="rId7" cstate="print">
               <a:extLst>
                 <a:ext uri="{28A0092B-C50C-407E-A947-70E740481C1C}">
-                  <a14:useLocalDpi xmlns:a14="http://schemas.microsoft.com/office/drawing/2010/main" val="0"/>
+                  <a14:useLocalDpi xmlns:a14="http://schemas.microsoft.com/office/drawing/2010/main"/>
                 </a:ext>
               </a:extLst>
             </a:blip>
@@ -7006,7 +7006,7 @@
             <p:nvPr/>
           </p:nvPicPr>
           <p:blipFill>
-            <a:blip r:embed="rId4">
+            <a:blip r:embed="rId4" cstate="print">
               <a:duotone>
                 <a:prstClr val="black"/>
                 <a:srgbClr val="D9C3A5">
@@ -7017,7 +7017,7 @@
               <a:extLst>
                 <a:ext uri="{BEBA8EAE-BF5A-486C-A8C5-ECC9F3942E4B}">
                   <a14:imgProps xmlns:a14="http://schemas.microsoft.com/office/drawing/2010/main">
-                    <a14:imgLayer r:embed="rId9">
+                    <a14:imgLayer r:embed="rId5">
                       <a14:imgEffect>
                         <a14:saturation sat="0"/>
                       </a14:imgEffect>
@@ -7025,7 +7025,7 @@
                   </a14:imgProps>
                 </a:ext>
                 <a:ext uri="{28A0092B-C50C-407E-A947-70E740481C1C}">
-                  <a14:useLocalDpi xmlns:a14="http://schemas.microsoft.com/office/drawing/2010/main" val="0"/>
+                  <a14:useLocalDpi xmlns:a14="http://schemas.microsoft.com/office/drawing/2010/main"/>
                 </a:ext>
               </a:extLst>
             </a:blip>
@@ -7069,14 +7069,14 @@
             <p:nvPr/>
           </p:nvPicPr>
           <p:blipFill rotWithShape="1">
-            <a:blip r:embed="rId6">
+            <a:blip r:embed="rId6" cstate="print">
               <a:extLst>
                 <a:ext uri="{28A0092B-C50C-407E-A947-70E740481C1C}">
-                  <a14:useLocalDpi xmlns:a14="http://schemas.microsoft.com/office/drawing/2010/main" val="0"/>
+                  <a14:useLocalDpi xmlns:a14="http://schemas.microsoft.com/office/drawing/2010/main"/>
                 </a:ext>
               </a:extLst>
             </a:blip>
-            <a:srcRect l="1820" t="8032" r="85779" b="6291"/>
+            <a:srcRect/>
             <a:stretch/>
           </p:blipFill>
           <p:spPr bwMode="auto">
@@ -7236,10 +7236,10 @@
             <p:nvPr/>
           </p:nvPicPr>
           <p:blipFill rotWithShape="1">
-            <a:blip r:embed="rId7">
+            <a:blip r:embed="rId7" cstate="print">
               <a:extLst>
                 <a:ext uri="{28A0092B-C50C-407E-A947-70E740481C1C}">
-                  <a14:useLocalDpi xmlns:a14="http://schemas.microsoft.com/office/drawing/2010/main" val="0"/>
+                  <a14:useLocalDpi xmlns:a14="http://schemas.microsoft.com/office/drawing/2010/main"/>
                 </a:ext>
               </a:extLst>
             </a:blip>
@@ -7281,7 +7281,7 @@
             <p:nvPr/>
           </p:nvPicPr>
           <p:blipFill>
-            <a:blip r:embed="rId4">
+            <a:blip r:embed="rId4" cstate="print">
               <a:duotone>
                 <a:prstClr val="black"/>
                 <a:srgbClr val="D9C3A5">
@@ -7292,7 +7292,7 @@
               <a:extLst>
                 <a:ext uri="{BEBA8EAE-BF5A-486C-A8C5-ECC9F3942E4B}">
                   <a14:imgProps xmlns:a14="http://schemas.microsoft.com/office/drawing/2010/main">
-                    <a14:imgLayer r:embed="rId10">
+                    <a14:imgLayer r:embed="rId8">
                       <a14:imgEffect>
                         <a14:saturation sat="0"/>
                       </a14:imgEffect>
@@ -7300,7 +7300,7 @@
                   </a14:imgProps>
                 </a:ext>
                 <a:ext uri="{28A0092B-C50C-407E-A947-70E740481C1C}">
-                  <a14:useLocalDpi xmlns:a14="http://schemas.microsoft.com/office/drawing/2010/main" val="0"/>
+                  <a14:useLocalDpi xmlns:a14="http://schemas.microsoft.com/office/drawing/2010/main"/>
                 </a:ext>
               </a:extLst>
             </a:blip>
@@ -7344,14 +7344,14 @@
             <p:nvPr/>
           </p:nvPicPr>
           <p:blipFill rotWithShape="1">
-            <a:blip r:embed="rId6">
+            <a:blip r:embed="rId6" cstate="print">
               <a:extLst>
                 <a:ext uri="{28A0092B-C50C-407E-A947-70E740481C1C}">
-                  <a14:useLocalDpi xmlns:a14="http://schemas.microsoft.com/office/drawing/2010/main" val="0"/>
+                  <a14:useLocalDpi xmlns:a14="http://schemas.microsoft.com/office/drawing/2010/main"/>
                 </a:ext>
               </a:extLst>
             </a:blip>
-            <a:srcRect l="1820" t="8032" r="85779" b="6291"/>
+            <a:srcRect/>
             <a:stretch/>
           </p:blipFill>
           <p:spPr bwMode="auto">
@@ -7489,7 +7489,7 @@
           <p:nvPr/>
         </p:nvPicPr>
         <p:blipFill>
-          <a:blip r:embed="rId4">
+          <a:blip r:embed="rId4" cstate="print">
             <a:duotone>
               <a:prstClr val="black"/>
               <a:srgbClr val="D9C3A5">
@@ -7500,7 +7500,7 @@
             <a:extLst>
               <a:ext uri="{BEBA8EAE-BF5A-486C-A8C5-ECC9F3942E4B}">
                 <a14:imgProps xmlns:a14="http://schemas.microsoft.com/office/drawing/2010/main">
-                  <a14:imgLayer r:embed="rId9">
+                  <a14:imgLayer r:embed="rId5">
                     <a14:imgEffect>
                       <a14:saturation sat="0"/>
                     </a14:imgEffect>
@@ -7508,7 +7508,7 @@
                 </a14:imgProps>
               </a:ext>
               <a:ext uri="{28A0092B-C50C-407E-A947-70E740481C1C}">
-                <a14:useLocalDpi xmlns:a14="http://schemas.microsoft.com/office/drawing/2010/main" val="0"/>
+                <a14:useLocalDpi xmlns:a14="http://schemas.microsoft.com/office/drawing/2010/main"/>
               </a:ext>
             </a:extLst>
           </a:blip>
@@ -7552,14 +7552,14 @@
           <p:nvPr/>
         </p:nvPicPr>
         <p:blipFill rotWithShape="1">
-          <a:blip r:embed="rId6">
+          <a:blip r:embed="rId6" cstate="print">
             <a:extLst>
               <a:ext uri="{28A0092B-C50C-407E-A947-70E740481C1C}">
-                <a14:useLocalDpi xmlns:a14="http://schemas.microsoft.com/office/drawing/2010/main" val="0"/>
+                <a14:useLocalDpi xmlns:a14="http://schemas.microsoft.com/office/drawing/2010/main"/>
               </a:ext>
             </a:extLst>
           </a:blip>
-          <a:srcRect l="1820" t="8032" r="85779" b="6291"/>
+          <a:srcRect/>
           <a:stretch/>
         </p:blipFill>
         <p:spPr bwMode="auto">
@@ -7681,14 +7681,14 @@
           <p:nvPr/>
         </p:nvPicPr>
         <p:blipFill rotWithShape="1">
-          <a:blip r:embed="rId3">
+          <a:blip r:embed="rId3" cstate="print">
             <a:extLst>
               <a:ext uri="{28A0092B-C50C-407E-A947-70E740481C1C}">
-                <a14:useLocalDpi xmlns:a14="http://schemas.microsoft.com/office/drawing/2010/main" val="0"/>
+                <a14:useLocalDpi xmlns:a14="http://schemas.microsoft.com/office/drawing/2010/main"/>
               </a:ext>
             </a:extLst>
           </a:blip>
-          <a:srcRect l="5625" r="7555"/>
+          <a:srcRect/>
           <a:stretch/>
         </p:blipFill>
         <p:spPr bwMode="auto">
@@ -7726,7 +7726,7 @@
           <p:nvPr/>
         </p:nvPicPr>
         <p:blipFill>
-          <a:blip r:embed="rId4">
+          <a:blip r:embed="rId4" cstate="print">
             <a:duotone>
               <a:prstClr val="black"/>
               <a:srgbClr val="D9C3A5">
@@ -7745,7 +7745,7 @@
                 </a14:imgProps>
               </a:ext>
               <a:ext uri="{28A0092B-C50C-407E-A947-70E740481C1C}">
-                <a14:useLocalDpi xmlns:a14="http://schemas.microsoft.com/office/drawing/2010/main" val="0"/>
+                <a14:useLocalDpi xmlns:a14="http://schemas.microsoft.com/office/drawing/2010/main"/>
               </a:ext>
             </a:extLst>
           </a:blip>
@@ -7850,14 +7850,14 @@
           <p:nvPr/>
         </p:nvPicPr>
         <p:blipFill rotWithShape="1">
-          <a:blip r:embed="rId6">
+          <a:blip r:embed="rId6" cstate="print">
             <a:extLst>
               <a:ext uri="{28A0092B-C50C-407E-A947-70E740481C1C}">
-                <a14:useLocalDpi xmlns:a14="http://schemas.microsoft.com/office/drawing/2010/main" val="0"/>
+                <a14:useLocalDpi xmlns:a14="http://schemas.microsoft.com/office/drawing/2010/main"/>
               </a:ext>
             </a:extLst>
           </a:blip>
-          <a:srcRect l="1820" t="8032" r="85779" b="6291"/>
+          <a:srcRect/>
           <a:stretch/>
         </p:blipFill>
         <p:spPr bwMode="auto">
@@ -7997,10 +7997,10 @@
           <p:nvPr/>
         </p:nvPicPr>
         <p:blipFill rotWithShape="1">
-          <a:blip r:embed="rId7">
+          <a:blip r:embed="rId7" cstate="print">
             <a:extLst>
               <a:ext uri="{28A0092B-C50C-407E-A947-70E740481C1C}">
-                <a14:useLocalDpi xmlns:a14="http://schemas.microsoft.com/office/drawing/2010/main" val="0"/>
+                <a14:useLocalDpi xmlns:a14="http://schemas.microsoft.com/office/drawing/2010/main"/>
               </a:ext>
             </a:extLst>
           </a:blip>
@@ -8159,10 +8159,10 @@
             <p:nvPr/>
           </p:nvPicPr>
           <p:blipFill rotWithShape="1">
-            <a:blip r:embed="rId7">
+            <a:blip r:embed="rId7" cstate="print">
               <a:extLst>
                 <a:ext uri="{28A0092B-C50C-407E-A947-70E740481C1C}">
-                  <a14:useLocalDpi xmlns:a14="http://schemas.microsoft.com/office/drawing/2010/main" val="0"/>
+                  <a14:useLocalDpi xmlns:a14="http://schemas.microsoft.com/office/drawing/2010/main"/>
                 </a:ext>
               </a:extLst>
             </a:blip>
@@ -8204,7 +8204,7 @@
             <p:nvPr/>
           </p:nvPicPr>
           <p:blipFill>
-            <a:blip r:embed="rId4">
+            <a:blip r:embed="rId4" cstate="print">
               <a:duotone>
                 <a:prstClr val="black"/>
                 <a:srgbClr val="D9C3A5">
@@ -8223,7 +8223,7 @@
                   </a14:imgProps>
                 </a:ext>
                 <a:ext uri="{28A0092B-C50C-407E-A947-70E740481C1C}">
-                  <a14:useLocalDpi xmlns:a14="http://schemas.microsoft.com/office/drawing/2010/main" val="0"/>
+                  <a14:useLocalDpi xmlns:a14="http://schemas.microsoft.com/office/drawing/2010/main"/>
                 </a:ext>
               </a:extLst>
             </a:blip>
@@ -8267,14 +8267,14 @@
             <p:nvPr/>
           </p:nvPicPr>
           <p:blipFill rotWithShape="1">
-            <a:blip r:embed="rId6">
+            <a:blip r:embed="rId6" cstate="print">
               <a:extLst>
                 <a:ext uri="{28A0092B-C50C-407E-A947-70E740481C1C}">
-                  <a14:useLocalDpi xmlns:a14="http://schemas.microsoft.com/office/drawing/2010/main" val="0"/>
+                  <a14:useLocalDpi xmlns:a14="http://schemas.microsoft.com/office/drawing/2010/main"/>
                 </a:ext>
               </a:extLst>
             </a:blip>
-            <a:srcRect l="1820" t="8032" r="85779" b="6291"/>
+            <a:srcRect/>
             <a:stretch/>
           </p:blipFill>
           <p:spPr bwMode="auto">
@@ -8434,10 +8434,10 @@
             <p:nvPr/>
           </p:nvPicPr>
           <p:blipFill rotWithShape="1">
-            <a:blip r:embed="rId7">
+            <a:blip r:embed="rId7" cstate="print">
               <a:extLst>
                 <a:ext uri="{28A0092B-C50C-407E-A947-70E740481C1C}">
-                  <a14:useLocalDpi xmlns:a14="http://schemas.microsoft.com/office/drawing/2010/main" val="0"/>
+                  <a14:useLocalDpi xmlns:a14="http://schemas.microsoft.com/office/drawing/2010/main"/>
                 </a:ext>
               </a:extLst>
             </a:blip>
@@ -8479,7 +8479,7 @@
             <p:nvPr/>
           </p:nvPicPr>
           <p:blipFill>
-            <a:blip r:embed="rId4">
+            <a:blip r:embed="rId4" cstate="print">
               <a:duotone>
                 <a:prstClr val="black"/>
                 <a:srgbClr val="D9C3A5">
@@ -8490,7 +8490,7 @@
               <a:extLst>
                 <a:ext uri="{BEBA8EAE-BF5A-486C-A8C5-ECC9F3942E4B}">
                   <a14:imgProps xmlns:a14="http://schemas.microsoft.com/office/drawing/2010/main">
-                    <a14:imgLayer r:embed="rId9">
+                    <a14:imgLayer r:embed="rId5">
                       <a14:imgEffect>
                         <a14:saturation sat="0"/>
                       </a14:imgEffect>
@@ -8498,7 +8498,7 @@
                   </a14:imgProps>
                 </a:ext>
                 <a:ext uri="{28A0092B-C50C-407E-A947-70E740481C1C}">
-                  <a14:useLocalDpi xmlns:a14="http://schemas.microsoft.com/office/drawing/2010/main" val="0"/>
+                  <a14:useLocalDpi xmlns:a14="http://schemas.microsoft.com/office/drawing/2010/main"/>
                 </a:ext>
               </a:extLst>
             </a:blip>
@@ -8542,14 +8542,14 @@
             <p:nvPr/>
           </p:nvPicPr>
           <p:blipFill rotWithShape="1">
-            <a:blip r:embed="rId6">
+            <a:blip r:embed="rId6" cstate="print">
               <a:extLst>
                 <a:ext uri="{28A0092B-C50C-407E-A947-70E740481C1C}">
-                  <a14:useLocalDpi xmlns:a14="http://schemas.microsoft.com/office/drawing/2010/main" val="0"/>
+                  <a14:useLocalDpi xmlns:a14="http://schemas.microsoft.com/office/drawing/2010/main"/>
                 </a:ext>
               </a:extLst>
             </a:blip>
-            <a:srcRect l="1820" t="8032" r="85779" b="6291"/>
+            <a:srcRect/>
             <a:stretch/>
           </p:blipFill>
           <p:spPr bwMode="auto">
@@ -8687,7 +8687,7 @@
           <p:nvPr/>
         </p:nvPicPr>
         <p:blipFill>
-          <a:blip r:embed="rId4">
+          <a:blip r:embed="rId4" cstate="print">
             <a:duotone>
               <a:prstClr val="black"/>
               <a:srgbClr val="D9C3A5">
@@ -8698,7 +8698,7 @@
             <a:extLst>
               <a:ext uri="{BEBA8EAE-BF5A-486C-A8C5-ECC9F3942E4B}">
                 <a14:imgProps xmlns:a14="http://schemas.microsoft.com/office/drawing/2010/main">
-                  <a14:imgLayer r:embed="rId10">
+                  <a14:imgLayer r:embed="rId5">
                     <a14:imgEffect>
                       <a14:saturation sat="0"/>
                     </a14:imgEffect>
@@ -8706,7 +8706,7 @@
                 </a14:imgProps>
               </a:ext>
               <a:ext uri="{28A0092B-C50C-407E-A947-70E740481C1C}">
-                <a14:useLocalDpi xmlns:a14="http://schemas.microsoft.com/office/drawing/2010/main" val="0"/>
+                <a14:useLocalDpi xmlns:a14="http://schemas.microsoft.com/office/drawing/2010/main"/>
               </a:ext>
             </a:extLst>
           </a:blip>
@@ -8750,14 +8750,14 @@
           <p:nvPr/>
         </p:nvPicPr>
         <p:blipFill rotWithShape="1">
-          <a:blip r:embed="rId6">
+          <a:blip r:embed="rId6" cstate="print">
             <a:extLst>
               <a:ext uri="{28A0092B-C50C-407E-A947-70E740481C1C}">
-                <a14:useLocalDpi xmlns:a14="http://schemas.microsoft.com/office/drawing/2010/main" val="0"/>
+                <a14:useLocalDpi xmlns:a14="http://schemas.microsoft.com/office/drawing/2010/main"/>
               </a:ext>
             </a:extLst>
           </a:blip>
-          <a:srcRect l="1820" t="8032" r="85779" b="6291"/>
+          <a:srcRect/>
           <a:stretch/>
         </p:blipFill>
         <p:spPr bwMode="auto">
@@ -8849,7 +8849,7 @@
           <p:nvPr/>
         </p:nvPicPr>
         <p:blipFill>
-          <a:blip r:embed="rId4">
+          <a:blip r:embed="rId4" cstate="print">
             <a:duotone>
               <a:prstClr val="black"/>
               <a:srgbClr val="D9C3A5">
@@ -8860,7 +8860,7 @@
             <a:extLst>
               <a:ext uri="{BEBA8EAE-BF5A-486C-A8C5-ECC9F3942E4B}">
                 <a14:imgProps xmlns:a14="http://schemas.microsoft.com/office/drawing/2010/main">
-                  <a14:imgLayer r:embed="rId10">
+                  <a14:imgLayer r:embed="rId9">
                     <a14:imgEffect>
                       <a14:saturation sat="0"/>
                     </a14:imgEffect>
@@ -8868,7 +8868,7 @@
                 </a14:imgProps>
               </a:ext>
               <a:ext uri="{28A0092B-C50C-407E-A947-70E740481C1C}">
-                <a14:useLocalDpi xmlns:a14="http://schemas.microsoft.com/office/drawing/2010/main" val="0"/>
+                <a14:useLocalDpi xmlns:a14="http://schemas.microsoft.com/office/drawing/2010/main"/>
               </a:ext>
             </a:extLst>
           </a:blip>
@@ -8912,14 +8912,14 @@
           <p:nvPr/>
         </p:nvPicPr>
         <p:blipFill rotWithShape="1">
-          <a:blip r:embed="rId6">
+          <a:blip r:embed="rId6" cstate="print">
             <a:extLst>
               <a:ext uri="{28A0092B-C50C-407E-A947-70E740481C1C}">
-                <a14:useLocalDpi xmlns:a14="http://schemas.microsoft.com/office/drawing/2010/main" val="0"/>
+                <a14:useLocalDpi xmlns:a14="http://schemas.microsoft.com/office/drawing/2010/main"/>
               </a:ext>
             </a:extLst>
           </a:blip>
-          <a:srcRect l="1820" t="8032" r="85779" b="6291"/>
+          <a:srcRect/>
           <a:stretch/>
         </p:blipFill>
         <p:spPr bwMode="auto">
@@ -9041,14 +9041,14 @@
           <p:nvPr/>
         </p:nvPicPr>
         <p:blipFill rotWithShape="1">
-          <a:blip r:embed="rId3">
+          <a:blip r:embed="rId3" cstate="print">
             <a:extLst>
               <a:ext uri="{28A0092B-C50C-407E-A947-70E740481C1C}">
-                <a14:useLocalDpi xmlns:a14="http://schemas.microsoft.com/office/drawing/2010/main" val="0"/>
+                <a14:useLocalDpi xmlns:a14="http://schemas.microsoft.com/office/drawing/2010/main"/>
               </a:ext>
             </a:extLst>
           </a:blip>
-          <a:srcRect l="5625" r="7555"/>
+          <a:srcRect/>
           <a:stretch/>
         </p:blipFill>
         <p:spPr bwMode="auto">
@@ -9086,7 +9086,7 @@
           <p:nvPr/>
         </p:nvPicPr>
         <p:blipFill>
-          <a:blip r:embed="rId4">
+          <a:blip r:embed="rId4" cstate="print">
             <a:duotone>
               <a:prstClr val="black"/>
               <a:srgbClr val="D9C3A5">
@@ -9105,7 +9105,7 @@
                 </a14:imgProps>
               </a:ext>
               <a:ext uri="{28A0092B-C50C-407E-A947-70E740481C1C}">
-                <a14:useLocalDpi xmlns:a14="http://schemas.microsoft.com/office/drawing/2010/main" val="0"/>
+                <a14:useLocalDpi xmlns:a14="http://schemas.microsoft.com/office/drawing/2010/main"/>
               </a:ext>
             </a:extLst>
           </a:blip>
@@ -9210,14 +9210,14 @@
           <p:nvPr/>
         </p:nvPicPr>
         <p:blipFill rotWithShape="1">
-          <a:blip r:embed="rId6">
+          <a:blip r:embed="rId6" cstate="print">
             <a:extLst>
               <a:ext uri="{28A0092B-C50C-407E-A947-70E740481C1C}">
-                <a14:useLocalDpi xmlns:a14="http://schemas.microsoft.com/office/drawing/2010/main" val="0"/>
+                <a14:useLocalDpi xmlns:a14="http://schemas.microsoft.com/office/drawing/2010/main"/>
               </a:ext>
             </a:extLst>
           </a:blip>
-          <a:srcRect l="1820" t="8032" r="85779" b="6291"/>
+          <a:srcRect/>
           <a:stretch/>
         </p:blipFill>
         <p:spPr bwMode="auto">
@@ -9357,10 +9357,10 @@
           <p:nvPr/>
         </p:nvPicPr>
         <p:blipFill rotWithShape="1">
-          <a:blip r:embed="rId7">
+          <a:blip r:embed="rId7" cstate="print">
             <a:extLst>
               <a:ext uri="{28A0092B-C50C-407E-A947-70E740481C1C}">
-                <a14:useLocalDpi xmlns:a14="http://schemas.microsoft.com/office/drawing/2010/main" val="0"/>
+                <a14:useLocalDpi xmlns:a14="http://schemas.microsoft.com/office/drawing/2010/main"/>
               </a:ext>
             </a:extLst>
           </a:blip>
@@ -9402,14 +9402,14 @@
           <p:nvPr/>
         </p:nvPicPr>
         <p:blipFill rotWithShape="1">
-          <a:blip r:embed="rId8">
+          <a:blip r:embed="rId8" cstate="print">
             <a:extLst>
               <a:ext uri="{28A0092B-C50C-407E-A947-70E740481C1C}">
-                <a14:useLocalDpi xmlns:a14="http://schemas.microsoft.com/office/drawing/2010/main" val="0"/>
+                <a14:useLocalDpi xmlns:a14="http://schemas.microsoft.com/office/drawing/2010/main"/>
               </a:ext>
             </a:extLst>
           </a:blip>
-          <a:srcRect l="13975" t="2295" r="14152" b="2295"/>
+          <a:srcRect/>
           <a:stretch/>
         </p:blipFill>
         <p:spPr bwMode="auto">
@@ -9515,10 +9515,10 @@
             <p:nvPr/>
           </p:nvPicPr>
           <p:blipFill rotWithShape="1">
-            <a:blip r:embed="rId7">
+            <a:blip r:embed="rId7" cstate="print">
               <a:extLst>
                 <a:ext uri="{28A0092B-C50C-407E-A947-70E740481C1C}">
-                  <a14:useLocalDpi xmlns:a14="http://schemas.microsoft.com/office/drawing/2010/main" val="0"/>
+                  <a14:useLocalDpi xmlns:a14="http://schemas.microsoft.com/office/drawing/2010/main"/>
                 </a:ext>
               </a:extLst>
             </a:blip>
@@ -9560,7 +9560,7 @@
             <p:nvPr/>
           </p:nvPicPr>
           <p:blipFill>
-            <a:blip r:embed="rId4">
+            <a:blip r:embed="rId4" cstate="print">
               <a:duotone>
                 <a:prstClr val="black"/>
                 <a:srgbClr val="D9C3A5">
@@ -9571,7 +9571,7 @@
               <a:extLst>
                 <a:ext uri="{BEBA8EAE-BF5A-486C-A8C5-ECC9F3942E4B}">
                   <a14:imgProps xmlns:a14="http://schemas.microsoft.com/office/drawing/2010/main">
-                    <a14:imgLayer r:embed="rId5">
+                    <a14:imgLayer r:embed="rId9">
                       <a14:imgEffect>
                         <a14:saturation sat="0"/>
                       </a14:imgEffect>
@@ -9579,7 +9579,7 @@
                   </a14:imgProps>
                 </a:ext>
                 <a:ext uri="{28A0092B-C50C-407E-A947-70E740481C1C}">
-                  <a14:useLocalDpi xmlns:a14="http://schemas.microsoft.com/office/drawing/2010/main" val="0"/>
+                  <a14:useLocalDpi xmlns:a14="http://schemas.microsoft.com/office/drawing/2010/main"/>
                 </a:ext>
               </a:extLst>
             </a:blip>
@@ -9623,14 +9623,14 @@
             <p:nvPr/>
           </p:nvPicPr>
           <p:blipFill rotWithShape="1">
-            <a:blip r:embed="rId6">
+            <a:blip r:embed="rId6" cstate="print">
               <a:extLst>
                 <a:ext uri="{28A0092B-C50C-407E-A947-70E740481C1C}">
-                  <a14:useLocalDpi xmlns:a14="http://schemas.microsoft.com/office/drawing/2010/main" val="0"/>
+                  <a14:useLocalDpi xmlns:a14="http://schemas.microsoft.com/office/drawing/2010/main"/>
                 </a:ext>
               </a:extLst>
             </a:blip>
-            <a:srcRect l="1820" t="8032" r="85779" b="6291"/>
+            <a:srcRect/>
             <a:stretch/>
           </p:blipFill>
           <p:spPr bwMode="auto">
@@ -9791,7 +9791,7 @@
             <p:nvPr/>
           </p:nvPicPr>
           <p:blipFill>
-            <a:blip r:embed="rId4">
+            <a:blip r:embed="rId4" cstate="print">
               <a:duotone>
                 <a:prstClr val="black"/>
                 <a:srgbClr val="D9C3A5">
@@ -9802,7 +9802,7 @@
               <a:extLst>
                 <a:ext uri="{BEBA8EAE-BF5A-486C-A8C5-ECC9F3942E4B}">
                   <a14:imgProps xmlns:a14="http://schemas.microsoft.com/office/drawing/2010/main">
-                    <a14:imgLayer r:embed="rId5">
+                    <a14:imgLayer r:embed="rId9">
                       <a14:imgEffect>
                         <a14:saturation sat="0"/>
                       </a14:imgEffect>
@@ -9810,7 +9810,7 @@
                   </a14:imgProps>
                 </a:ext>
                 <a:ext uri="{28A0092B-C50C-407E-A947-70E740481C1C}">
-                  <a14:useLocalDpi xmlns:a14="http://schemas.microsoft.com/office/drawing/2010/main" val="0"/>
+                  <a14:useLocalDpi xmlns:a14="http://schemas.microsoft.com/office/drawing/2010/main"/>
                 </a:ext>
               </a:extLst>
             </a:blip>
@@ -9854,14 +9854,14 @@
             <p:nvPr/>
           </p:nvPicPr>
           <p:blipFill rotWithShape="1">
-            <a:blip r:embed="rId6">
+            <a:blip r:embed="rId6" cstate="print">
               <a:extLst>
                 <a:ext uri="{28A0092B-C50C-407E-A947-70E740481C1C}">
-                  <a14:useLocalDpi xmlns:a14="http://schemas.microsoft.com/office/drawing/2010/main" val="0"/>
+                  <a14:useLocalDpi xmlns:a14="http://schemas.microsoft.com/office/drawing/2010/main"/>
                 </a:ext>
               </a:extLst>
             </a:blip>
-            <a:srcRect l="1820" t="8032" r="85779" b="6291"/>
+            <a:srcRect/>
             <a:stretch/>
           </p:blipFill>
           <p:spPr bwMode="auto">
@@ -10000,7 +10000,7 @@
           <p:nvPr/>
         </p:nvPicPr>
         <p:blipFill>
-          <a:blip r:embed="rId4">
+          <a:blip r:embed="rId4" cstate="print">
             <a:duotone>
               <a:prstClr val="black"/>
               <a:srgbClr val="D9C3A5">
@@ -10019,7 +10019,7 @@
                 </a14:imgProps>
               </a:ext>
               <a:ext uri="{28A0092B-C50C-407E-A947-70E740481C1C}">
-                <a14:useLocalDpi xmlns:a14="http://schemas.microsoft.com/office/drawing/2010/main" val="0"/>
+                <a14:useLocalDpi xmlns:a14="http://schemas.microsoft.com/office/drawing/2010/main"/>
               </a:ext>
             </a:extLst>
           </a:blip>
@@ -10063,14 +10063,14 @@
           <p:nvPr/>
         </p:nvPicPr>
         <p:blipFill rotWithShape="1">
-          <a:blip r:embed="rId6">
+          <a:blip r:embed="rId6" cstate="print">
             <a:extLst>
               <a:ext uri="{28A0092B-C50C-407E-A947-70E740481C1C}">
-                <a14:useLocalDpi xmlns:a14="http://schemas.microsoft.com/office/drawing/2010/main" val="0"/>
+                <a14:useLocalDpi xmlns:a14="http://schemas.microsoft.com/office/drawing/2010/main"/>
               </a:ext>
             </a:extLst>
           </a:blip>
-          <a:srcRect l="1820" t="8032" r="85779" b="6291"/>
+          <a:srcRect/>
           <a:stretch/>
         </p:blipFill>
         <p:spPr bwMode="auto">
@@ -10212,7 +10212,7 @@
           <p:nvPr/>
         </p:nvPicPr>
         <p:blipFill>
-          <a:blip r:embed="rId4">
+          <a:blip r:embed="rId4" cstate="print">
             <a:duotone>
               <a:prstClr val="black"/>
               <a:srgbClr val="D9C3A5">
@@ -10223,7 +10223,7 @@
             <a:extLst>
               <a:ext uri="{BEBA8EAE-BF5A-486C-A8C5-ECC9F3942E4B}">
                 <a14:imgProps xmlns:a14="http://schemas.microsoft.com/office/drawing/2010/main">
-                  <a14:imgLayer r:embed="rId5">
+                  <a14:imgLayer r:embed="rId9">
                     <a14:imgEffect>
                       <a14:saturation sat="0"/>
                     </a14:imgEffect>
@@ -10231,7 +10231,7 @@
                 </a14:imgProps>
               </a:ext>
               <a:ext uri="{28A0092B-C50C-407E-A947-70E740481C1C}">
-                <a14:useLocalDpi xmlns:a14="http://schemas.microsoft.com/office/drawing/2010/main" val="0"/>
+                <a14:useLocalDpi xmlns:a14="http://schemas.microsoft.com/office/drawing/2010/main"/>
               </a:ext>
             </a:extLst>
           </a:blip>
@@ -10275,14 +10275,14 @@
           <p:nvPr/>
         </p:nvPicPr>
         <p:blipFill rotWithShape="1">
-          <a:blip r:embed="rId6">
+          <a:blip r:embed="rId6" cstate="print">
             <a:extLst>
               <a:ext uri="{28A0092B-C50C-407E-A947-70E740481C1C}">
-                <a14:useLocalDpi xmlns:a14="http://schemas.microsoft.com/office/drawing/2010/main" val="0"/>
+                <a14:useLocalDpi xmlns:a14="http://schemas.microsoft.com/office/drawing/2010/main"/>
               </a:ext>
             </a:extLst>
           </a:blip>
-          <a:srcRect l="1820" t="8032" r="85779" b="6291"/>
+          <a:srcRect/>
           <a:stretch/>
         </p:blipFill>
         <p:spPr bwMode="auto">
@@ -10404,14 +10404,14 @@
           <p:nvPr/>
         </p:nvPicPr>
         <p:blipFill rotWithShape="1">
-          <a:blip r:embed="rId3">
+          <a:blip r:embed="rId3" cstate="print">
             <a:extLst>
               <a:ext uri="{28A0092B-C50C-407E-A947-70E740481C1C}">
-                <a14:useLocalDpi xmlns:a14="http://schemas.microsoft.com/office/drawing/2010/main" val="0"/>
+                <a14:useLocalDpi xmlns:a14="http://schemas.microsoft.com/office/drawing/2010/main"/>
               </a:ext>
             </a:extLst>
           </a:blip>
-          <a:srcRect l="5625" r="7555"/>
+          <a:srcRect/>
           <a:stretch/>
         </p:blipFill>
         <p:spPr bwMode="auto">
@@ -10449,7 +10449,7 @@
           <p:nvPr/>
         </p:nvPicPr>
         <p:blipFill>
-          <a:blip r:embed="rId4">
+          <a:blip r:embed="rId4" cstate="print">
             <a:duotone>
               <a:prstClr val="black"/>
               <a:srgbClr val="D9C3A5">
@@ -10468,7 +10468,7 @@
                 </a14:imgProps>
               </a:ext>
               <a:ext uri="{28A0092B-C50C-407E-A947-70E740481C1C}">
-                <a14:useLocalDpi xmlns:a14="http://schemas.microsoft.com/office/drawing/2010/main" val="0"/>
+                <a14:useLocalDpi xmlns:a14="http://schemas.microsoft.com/office/drawing/2010/main"/>
               </a:ext>
             </a:extLst>
           </a:blip>
@@ -10573,14 +10573,14 @@
           <p:nvPr/>
         </p:nvPicPr>
         <p:blipFill rotWithShape="1">
-          <a:blip r:embed="rId6">
+          <a:blip r:embed="rId6" cstate="print">
             <a:extLst>
               <a:ext uri="{28A0092B-C50C-407E-A947-70E740481C1C}">
-                <a14:useLocalDpi xmlns:a14="http://schemas.microsoft.com/office/drawing/2010/main" val="0"/>
+                <a14:useLocalDpi xmlns:a14="http://schemas.microsoft.com/office/drawing/2010/main"/>
               </a:ext>
             </a:extLst>
           </a:blip>
-          <a:srcRect l="1820" t="8032" r="85779" b="6291"/>
+          <a:srcRect/>
           <a:stretch/>
         </p:blipFill>
         <p:spPr bwMode="auto">
@@ -10763,14 +10763,14 @@
           <p:nvPr/>
         </p:nvPicPr>
         <p:blipFill rotWithShape="1">
-          <a:blip r:embed="rId3">
+          <a:blip r:embed="rId3" cstate="print">
             <a:extLst>
               <a:ext uri="{28A0092B-C50C-407E-A947-70E740481C1C}">
-                <a14:useLocalDpi xmlns:a14="http://schemas.microsoft.com/office/drawing/2010/main" val="0"/>
+                <a14:useLocalDpi xmlns:a14="http://schemas.microsoft.com/office/drawing/2010/main"/>
               </a:ext>
             </a:extLst>
           </a:blip>
-          <a:srcRect l="5625" r="7555"/>
+          <a:srcRect/>
           <a:stretch/>
         </p:blipFill>
         <p:spPr bwMode="auto">
@@ -10808,7 +10808,7 @@
           <p:nvPr/>
         </p:nvPicPr>
         <p:blipFill>
-          <a:blip r:embed="rId4">
+          <a:blip r:embed="rId4" cstate="print">
             <a:duotone>
               <a:prstClr val="black"/>
               <a:srgbClr val="D9C3A5">
@@ -10827,7 +10827,7 @@
                 </a14:imgProps>
               </a:ext>
               <a:ext uri="{28A0092B-C50C-407E-A947-70E740481C1C}">
-                <a14:useLocalDpi xmlns:a14="http://schemas.microsoft.com/office/drawing/2010/main" val="0"/>
+                <a14:useLocalDpi xmlns:a14="http://schemas.microsoft.com/office/drawing/2010/main"/>
               </a:ext>
             </a:extLst>
           </a:blip>
@@ -10932,14 +10932,14 @@
           <p:nvPr/>
         </p:nvPicPr>
         <p:blipFill rotWithShape="1">
-          <a:blip r:embed="rId6">
+          <a:blip r:embed="rId6" cstate="print">
             <a:extLst>
               <a:ext uri="{28A0092B-C50C-407E-A947-70E740481C1C}">
-                <a14:useLocalDpi xmlns:a14="http://schemas.microsoft.com/office/drawing/2010/main" val="0"/>
+                <a14:useLocalDpi xmlns:a14="http://schemas.microsoft.com/office/drawing/2010/main"/>
               </a:ext>
             </a:extLst>
           </a:blip>
-          <a:srcRect l="1820" t="8032" r="85779" b="6291"/>
+          <a:srcRect/>
           <a:stretch/>
         </p:blipFill>
         <p:spPr bwMode="auto">
@@ -11061,14 +11061,14 @@
           <p:nvPr/>
         </p:nvPicPr>
         <p:blipFill rotWithShape="1">
-          <a:blip r:embed="rId3">
+          <a:blip r:embed="rId3" cstate="print">
             <a:extLst>
               <a:ext uri="{28A0092B-C50C-407E-A947-70E740481C1C}">
-                <a14:useLocalDpi xmlns:a14="http://schemas.microsoft.com/office/drawing/2010/main" val="0"/>
+                <a14:useLocalDpi xmlns:a14="http://schemas.microsoft.com/office/drawing/2010/main"/>
               </a:ext>
             </a:extLst>
           </a:blip>
-          <a:srcRect l="5625" r="7555"/>
+          <a:srcRect/>
           <a:stretch/>
         </p:blipFill>
         <p:spPr bwMode="auto">
@@ -11106,7 +11106,7 @@
           <p:nvPr/>
         </p:nvPicPr>
         <p:blipFill>
-          <a:blip r:embed="rId4">
+          <a:blip r:embed="rId4" cstate="print">
             <a:duotone>
               <a:prstClr val="black"/>
               <a:srgbClr val="D9C3A5">
@@ -11125,7 +11125,7 @@
                 </a14:imgProps>
               </a:ext>
               <a:ext uri="{28A0092B-C50C-407E-A947-70E740481C1C}">
-                <a14:useLocalDpi xmlns:a14="http://schemas.microsoft.com/office/drawing/2010/main" val="0"/>
+                <a14:useLocalDpi xmlns:a14="http://schemas.microsoft.com/office/drawing/2010/main"/>
               </a:ext>
             </a:extLst>
           </a:blip>
@@ -11230,14 +11230,14 @@
           <p:nvPr/>
         </p:nvPicPr>
         <p:blipFill rotWithShape="1">
-          <a:blip r:embed="rId6">
+          <a:blip r:embed="rId6" cstate="print">
             <a:extLst>
               <a:ext uri="{28A0092B-C50C-407E-A947-70E740481C1C}">
-                <a14:useLocalDpi xmlns:a14="http://schemas.microsoft.com/office/drawing/2010/main" val="0"/>
+                <a14:useLocalDpi xmlns:a14="http://schemas.microsoft.com/office/drawing/2010/main"/>
               </a:ext>
             </a:extLst>
           </a:blip>
-          <a:srcRect l="1820" t="8032" r="85779" b="6291"/>
+          <a:srcRect/>
           <a:stretch/>
         </p:blipFill>
         <p:spPr bwMode="auto">
@@ -11377,10 +11377,10 @@
           <p:nvPr/>
         </p:nvPicPr>
         <p:blipFill rotWithShape="1">
-          <a:blip r:embed="rId7">
+          <a:blip r:embed="rId7" cstate="print">
             <a:extLst>
               <a:ext uri="{28A0092B-C50C-407E-A947-70E740481C1C}">
-                <a14:useLocalDpi xmlns:a14="http://schemas.microsoft.com/office/drawing/2010/main" val="0"/>
+                <a14:useLocalDpi xmlns:a14="http://schemas.microsoft.com/office/drawing/2010/main"/>
               </a:ext>
             </a:extLst>
           </a:blip>
@@ -11452,14 +11452,14 @@
           <p:nvPr/>
         </p:nvPicPr>
         <p:blipFill rotWithShape="1">
-          <a:blip r:embed="rId3">
+          <a:blip r:embed="rId3" cstate="print">
             <a:extLst>
               <a:ext uri="{28A0092B-C50C-407E-A947-70E740481C1C}">
-                <a14:useLocalDpi xmlns:a14="http://schemas.microsoft.com/office/drawing/2010/main" val="0"/>
+                <a14:useLocalDpi xmlns:a14="http://schemas.microsoft.com/office/drawing/2010/main"/>
               </a:ext>
             </a:extLst>
           </a:blip>
-          <a:srcRect l="5625" r="7555"/>
+          <a:srcRect/>
           <a:stretch/>
         </p:blipFill>
         <p:spPr bwMode="auto">
@@ -11497,7 +11497,7 @@
           <p:nvPr/>
         </p:nvPicPr>
         <p:blipFill>
-          <a:blip r:embed="rId4">
+          <a:blip r:embed="rId4" cstate="print">
             <a:duotone>
               <a:prstClr val="black"/>
               <a:srgbClr val="D9C3A5">
@@ -11516,7 +11516,7 @@
                 </a14:imgProps>
               </a:ext>
               <a:ext uri="{28A0092B-C50C-407E-A947-70E740481C1C}">
-                <a14:useLocalDpi xmlns:a14="http://schemas.microsoft.com/office/drawing/2010/main" val="0"/>
+                <a14:useLocalDpi xmlns:a14="http://schemas.microsoft.com/office/drawing/2010/main"/>
               </a:ext>
             </a:extLst>
           </a:blip>
@@ -11621,14 +11621,14 @@
           <p:nvPr/>
         </p:nvPicPr>
         <p:blipFill rotWithShape="1">
-          <a:blip r:embed="rId6">
+          <a:blip r:embed="rId6" cstate="print">
             <a:extLst>
               <a:ext uri="{28A0092B-C50C-407E-A947-70E740481C1C}">
-                <a14:useLocalDpi xmlns:a14="http://schemas.microsoft.com/office/drawing/2010/main" val="0"/>
+                <a14:useLocalDpi xmlns:a14="http://schemas.microsoft.com/office/drawing/2010/main"/>
               </a:ext>
             </a:extLst>
           </a:blip>
-          <a:srcRect l="1820" t="8032" r="85779" b="6291"/>
+          <a:srcRect/>
           <a:stretch/>
         </p:blipFill>
         <p:spPr bwMode="auto">
@@ -11768,10 +11768,10 @@
           <p:nvPr/>
         </p:nvPicPr>
         <p:blipFill rotWithShape="1">
-          <a:blip r:embed="rId7">
+          <a:blip r:embed="rId7" cstate="print">
             <a:extLst>
               <a:ext uri="{28A0092B-C50C-407E-A947-70E740481C1C}">
-                <a14:useLocalDpi xmlns:a14="http://schemas.microsoft.com/office/drawing/2010/main" val="0"/>
+                <a14:useLocalDpi xmlns:a14="http://schemas.microsoft.com/office/drawing/2010/main"/>
               </a:ext>
             </a:extLst>
           </a:blip>
@@ -11813,7 +11813,7 @@
           <p:nvPr/>
         </p:nvPicPr>
         <p:blipFill>
-          <a:blip r:embed="rId4">
+          <a:blip r:embed="rId4" cstate="print">
             <a:duotone>
               <a:prstClr val="black"/>
               <a:srgbClr val="D9C3A5">
@@ -11832,7 +11832,7 @@
                 </a14:imgProps>
               </a:ext>
               <a:ext uri="{28A0092B-C50C-407E-A947-70E740481C1C}">
-                <a14:useLocalDpi xmlns:a14="http://schemas.microsoft.com/office/drawing/2010/main" val="0"/>
+                <a14:useLocalDpi xmlns:a14="http://schemas.microsoft.com/office/drawing/2010/main"/>
               </a:ext>
             </a:extLst>
           </a:blip>
@@ -11876,14 +11876,14 @@
           <p:nvPr/>
         </p:nvPicPr>
         <p:blipFill rotWithShape="1">
-          <a:blip r:embed="rId6">
+          <a:blip r:embed="rId6" cstate="print">
             <a:extLst>
               <a:ext uri="{28A0092B-C50C-407E-A947-70E740481C1C}">
-                <a14:useLocalDpi xmlns:a14="http://schemas.microsoft.com/office/drawing/2010/main" val="0"/>
+                <a14:useLocalDpi xmlns:a14="http://schemas.microsoft.com/office/drawing/2010/main"/>
               </a:ext>
             </a:extLst>
           </a:blip>
-          <a:srcRect l="1820" t="8032" r="85779" b="6291"/>
+          <a:srcRect/>
           <a:stretch/>
         </p:blipFill>
         <p:spPr bwMode="auto">
@@ -12005,14 +12005,14 @@
           <p:nvPr/>
         </p:nvPicPr>
         <p:blipFill rotWithShape="1">
-          <a:blip r:embed="rId3">
+          <a:blip r:embed="rId3" cstate="print">
             <a:extLst>
               <a:ext uri="{28A0092B-C50C-407E-A947-70E740481C1C}">
-                <a14:useLocalDpi xmlns:a14="http://schemas.microsoft.com/office/drawing/2010/main" val="0"/>
+                <a14:useLocalDpi xmlns:a14="http://schemas.microsoft.com/office/drawing/2010/main"/>
               </a:ext>
             </a:extLst>
           </a:blip>
-          <a:srcRect l="5625" r="7555"/>
+          <a:srcRect/>
           <a:stretch/>
         </p:blipFill>
         <p:spPr bwMode="auto">
@@ -12050,7 +12050,7 @@
           <p:nvPr/>
         </p:nvPicPr>
         <p:blipFill>
-          <a:blip r:embed="rId4">
+          <a:blip r:embed="rId4" cstate="print">
             <a:duotone>
               <a:prstClr val="black"/>
               <a:srgbClr val="D9C3A5">
@@ -12069,7 +12069,7 @@
                 </a14:imgProps>
               </a:ext>
               <a:ext uri="{28A0092B-C50C-407E-A947-70E740481C1C}">
-                <a14:useLocalDpi xmlns:a14="http://schemas.microsoft.com/office/drawing/2010/main" val="0"/>
+                <a14:useLocalDpi xmlns:a14="http://schemas.microsoft.com/office/drawing/2010/main"/>
               </a:ext>
             </a:extLst>
           </a:blip>
@@ -12174,14 +12174,14 @@
           <p:nvPr/>
         </p:nvPicPr>
         <p:blipFill rotWithShape="1">
-          <a:blip r:embed="rId6">
+          <a:blip r:embed="rId6" cstate="print">
             <a:extLst>
               <a:ext uri="{28A0092B-C50C-407E-A947-70E740481C1C}">
-                <a14:useLocalDpi xmlns:a14="http://schemas.microsoft.com/office/drawing/2010/main" val="0"/>
+                <a14:useLocalDpi xmlns:a14="http://schemas.microsoft.com/office/drawing/2010/main"/>
               </a:ext>
             </a:extLst>
           </a:blip>
-          <a:srcRect l="1820" t="8032" r="85779" b="6291"/>
+          <a:srcRect/>
           <a:stretch/>
         </p:blipFill>
         <p:spPr bwMode="auto">
@@ -12321,10 +12321,10 @@
           <p:nvPr/>
         </p:nvPicPr>
         <p:blipFill rotWithShape="1">
-          <a:blip r:embed="rId7">
+          <a:blip r:embed="rId7" cstate="print">
             <a:extLst>
               <a:ext uri="{28A0092B-C50C-407E-A947-70E740481C1C}">
-                <a14:useLocalDpi xmlns:a14="http://schemas.microsoft.com/office/drawing/2010/main" val="0"/>
+                <a14:useLocalDpi xmlns:a14="http://schemas.microsoft.com/office/drawing/2010/main"/>
               </a:ext>
             </a:extLst>
           </a:blip>
@@ -12434,10 +12434,10 @@
             <p:nvPr/>
           </p:nvPicPr>
           <p:blipFill rotWithShape="1">
-            <a:blip r:embed="rId7">
+            <a:blip r:embed="rId7" cstate="print">
               <a:extLst>
                 <a:ext uri="{28A0092B-C50C-407E-A947-70E740481C1C}">
-                  <a14:useLocalDpi xmlns:a14="http://schemas.microsoft.com/office/drawing/2010/main" val="0"/>
+                  <a14:useLocalDpi xmlns:a14="http://schemas.microsoft.com/office/drawing/2010/main"/>
                 </a:ext>
               </a:extLst>
             </a:blip>
@@ -12479,7 +12479,7 @@
             <p:nvPr/>
           </p:nvPicPr>
           <p:blipFill>
-            <a:blip r:embed="rId4">
+            <a:blip r:embed="rId4" cstate="print">
               <a:duotone>
                 <a:prstClr val="black"/>
                 <a:srgbClr val="D9C3A5">
@@ -12490,7 +12490,7 @@
               <a:extLst>
                 <a:ext uri="{BEBA8EAE-BF5A-486C-A8C5-ECC9F3942E4B}">
                   <a14:imgProps xmlns:a14="http://schemas.microsoft.com/office/drawing/2010/main">
-                    <a14:imgLayer r:embed="rId5">
+                    <a14:imgLayer r:embed="rId8">
                       <a14:imgEffect>
                         <a14:saturation sat="0"/>
                       </a14:imgEffect>
@@ -12498,7 +12498,7 @@
                   </a14:imgProps>
                 </a:ext>
                 <a:ext uri="{28A0092B-C50C-407E-A947-70E740481C1C}">
-                  <a14:useLocalDpi xmlns:a14="http://schemas.microsoft.com/office/drawing/2010/main" val="0"/>
+                  <a14:useLocalDpi xmlns:a14="http://schemas.microsoft.com/office/drawing/2010/main"/>
                 </a:ext>
               </a:extLst>
             </a:blip>
@@ -12542,14 +12542,14 @@
             <p:nvPr/>
           </p:nvPicPr>
           <p:blipFill rotWithShape="1">
-            <a:blip r:embed="rId6">
+            <a:blip r:embed="rId6" cstate="print">
               <a:extLst>
                 <a:ext uri="{28A0092B-C50C-407E-A947-70E740481C1C}">
-                  <a14:useLocalDpi xmlns:a14="http://schemas.microsoft.com/office/drawing/2010/main" val="0"/>
+                  <a14:useLocalDpi xmlns:a14="http://schemas.microsoft.com/office/drawing/2010/main"/>
                 </a:ext>
               </a:extLst>
             </a:blip>
-            <a:srcRect l="1820" t="8032" r="85779" b="6291"/>
+            <a:srcRect/>
             <a:stretch/>
           </p:blipFill>
           <p:spPr bwMode="auto">
@@ -12672,14 +12672,14 @@
           <p:nvPr/>
         </p:nvPicPr>
         <p:blipFill rotWithShape="1">
-          <a:blip r:embed="rId3">
+          <a:blip r:embed="rId3" cstate="print">
             <a:extLst>
               <a:ext uri="{28A0092B-C50C-407E-A947-70E740481C1C}">
-                <a14:useLocalDpi xmlns:a14="http://schemas.microsoft.com/office/drawing/2010/main" val="0"/>
+                <a14:useLocalDpi xmlns:a14="http://schemas.microsoft.com/office/drawing/2010/main"/>
               </a:ext>
             </a:extLst>
           </a:blip>
-          <a:srcRect l="5625" r="7555"/>
+          <a:srcRect/>
           <a:stretch/>
         </p:blipFill>
         <p:spPr bwMode="auto">
@@ -12717,7 +12717,7 @@
           <p:nvPr/>
         </p:nvPicPr>
         <p:blipFill>
-          <a:blip r:embed="rId4">
+          <a:blip r:embed="rId4" cstate="print">
             <a:duotone>
               <a:prstClr val="black"/>
               <a:srgbClr val="D9C3A5">
@@ -12736,7 +12736,7 @@
                 </a14:imgProps>
               </a:ext>
               <a:ext uri="{28A0092B-C50C-407E-A947-70E740481C1C}">
-                <a14:useLocalDpi xmlns:a14="http://schemas.microsoft.com/office/drawing/2010/main" val="0"/>
+                <a14:useLocalDpi xmlns:a14="http://schemas.microsoft.com/office/drawing/2010/main"/>
               </a:ext>
             </a:extLst>
           </a:blip>
@@ -12841,14 +12841,14 @@
           <p:nvPr/>
         </p:nvPicPr>
         <p:blipFill rotWithShape="1">
-          <a:blip r:embed="rId6">
+          <a:blip r:embed="rId6" cstate="print">
             <a:extLst>
               <a:ext uri="{28A0092B-C50C-407E-A947-70E740481C1C}">
-                <a14:useLocalDpi xmlns:a14="http://schemas.microsoft.com/office/drawing/2010/main" val="0"/>
+                <a14:useLocalDpi xmlns:a14="http://schemas.microsoft.com/office/drawing/2010/main"/>
               </a:ext>
             </a:extLst>
           </a:blip>
-          <a:srcRect l="1820" t="8032" r="85779" b="6291"/>
+          <a:srcRect/>
           <a:stretch/>
         </p:blipFill>
         <p:spPr bwMode="auto">
@@ -12988,10 +12988,10 @@
           <p:nvPr/>
         </p:nvPicPr>
         <p:blipFill rotWithShape="1">
-          <a:blip r:embed="rId7">
+          <a:blip r:embed="rId7" cstate="print">
             <a:extLst>
               <a:ext uri="{28A0092B-C50C-407E-A947-70E740481C1C}">
-                <a14:useLocalDpi xmlns:a14="http://schemas.microsoft.com/office/drawing/2010/main" val="0"/>
+                <a14:useLocalDpi xmlns:a14="http://schemas.microsoft.com/office/drawing/2010/main"/>
               </a:ext>
             </a:extLst>
           </a:blip>
@@ -13033,7 +13033,7 @@
           <p:nvPr/>
         </p:nvPicPr>
         <p:blipFill>
-          <a:blip r:embed="rId4">
+          <a:blip r:embed="rId4" cstate="print">
             <a:duotone>
               <a:prstClr val="black"/>
               <a:srgbClr val="D9C3A5">
@@ -13052,7 +13052,7 @@
                 </a14:imgProps>
               </a:ext>
               <a:ext uri="{28A0092B-C50C-407E-A947-70E740481C1C}">
-                <a14:useLocalDpi xmlns:a14="http://schemas.microsoft.com/office/drawing/2010/main" val="0"/>
+                <a14:useLocalDpi xmlns:a14="http://schemas.microsoft.com/office/drawing/2010/main"/>
               </a:ext>
             </a:extLst>
           </a:blip>
@@ -13096,14 +13096,14 @@
           <p:nvPr/>
         </p:nvPicPr>
         <p:blipFill rotWithShape="1">
-          <a:blip r:embed="rId6">
+          <a:blip r:embed="rId6" cstate="print">
             <a:extLst>
               <a:ext uri="{28A0092B-C50C-407E-A947-70E740481C1C}">
-                <a14:useLocalDpi xmlns:a14="http://schemas.microsoft.com/office/drawing/2010/main" val="0"/>
+                <a14:useLocalDpi xmlns:a14="http://schemas.microsoft.com/office/drawing/2010/main"/>
               </a:ext>
             </a:extLst>
           </a:blip>
-          <a:srcRect l="1820" t="8032" r="85779" b="6291"/>
+          <a:srcRect/>
           <a:stretch/>
         </p:blipFill>
         <p:spPr bwMode="auto">
@@ -13263,10 +13263,10 @@
             <p:nvPr/>
           </p:nvPicPr>
           <p:blipFill rotWithShape="1">
-            <a:blip r:embed="rId7">
+            <a:blip r:embed="rId7" cstate="print">
               <a:extLst>
                 <a:ext uri="{28A0092B-C50C-407E-A947-70E740481C1C}">
-                  <a14:useLocalDpi xmlns:a14="http://schemas.microsoft.com/office/drawing/2010/main" val="0"/>
+                  <a14:useLocalDpi xmlns:a14="http://schemas.microsoft.com/office/drawing/2010/main"/>
                 </a:ext>
               </a:extLst>
             </a:blip>
@@ -13308,7 +13308,7 @@
             <p:nvPr/>
           </p:nvPicPr>
           <p:blipFill>
-            <a:blip r:embed="rId4">
+            <a:blip r:embed="rId4" cstate="print">
               <a:duotone>
                 <a:prstClr val="black"/>
                 <a:srgbClr val="D9C3A5">
@@ -13327,7 +13327,7 @@
                   </a14:imgProps>
                 </a:ext>
                 <a:ext uri="{28A0092B-C50C-407E-A947-70E740481C1C}">
-                  <a14:useLocalDpi xmlns:a14="http://schemas.microsoft.com/office/drawing/2010/main" val="0"/>
+                  <a14:useLocalDpi xmlns:a14="http://schemas.microsoft.com/office/drawing/2010/main"/>
                 </a:ext>
               </a:extLst>
             </a:blip>
@@ -13371,14 +13371,14 @@
             <p:nvPr/>
           </p:nvPicPr>
           <p:blipFill rotWithShape="1">
-            <a:blip r:embed="rId6">
+            <a:blip r:embed="rId6" cstate="print">
               <a:extLst>
                 <a:ext uri="{28A0092B-C50C-407E-A947-70E740481C1C}">
-                  <a14:useLocalDpi xmlns:a14="http://schemas.microsoft.com/office/drawing/2010/main" val="0"/>
+                  <a14:useLocalDpi xmlns:a14="http://schemas.microsoft.com/office/drawing/2010/main"/>
                 </a:ext>
               </a:extLst>
             </a:blip>
-            <a:srcRect l="1820" t="8032" r="85779" b="6291"/>
+            <a:srcRect/>
             <a:stretch/>
           </p:blipFill>
           <p:spPr bwMode="auto">
@@ -13501,14 +13501,14 @@
           <p:nvPr/>
         </p:nvPicPr>
         <p:blipFill rotWithShape="1">
-          <a:blip r:embed="rId3">
+          <a:blip r:embed="rId3" cstate="print">
             <a:extLst>
               <a:ext uri="{28A0092B-C50C-407E-A947-70E740481C1C}">
-                <a14:useLocalDpi xmlns:a14="http://schemas.microsoft.com/office/drawing/2010/main" val="0"/>
+                <a14:useLocalDpi xmlns:a14="http://schemas.microsoft.com/office/drawing/2010/main"/>
               </a:ext>
             </a:extLst>
           </a:blip>
-          <a:srcRect l="5625" r="7555"/>
+          <a:srcRect/>
           <a:stretch/>
         </p:blipFill>
         <p:spPr bwMode="auto">
@@ -13546,7 +13546,7 @@
           <p:nvPr/>
         </p:nvPicPr>
         <p:blipFill>
-          <a:blip r:embed="rId4">
+          <a:blip r:embed="rId4" cstate="print">
             <a:duotone>
               <a:prstClr val="black"/>
               <a:srgbClr val="D9C3A5">
@@ -13565,7 +13565,7 @@
                 </a14:imgProps>
               </a:ext>
               <a:ext uri="{28A0092B-C50C-407E-A947-70E740481C1C}">
-                <a14:useLocalDpi xmlns:a14="http://schemas.microsoft.com/office/drawing/2010/main" val="0"/>
+                <a14:useLocalDpi xmlns:a14="http://schemas.microsoft.com/office/drawing/2010/main"/>
               </a:ext>
             </a:extLst>
           </a:blip>
@@ -13670,14 +13670,14 @@
           <p:nvPr/>
         </p:nvPicPr>
         <p:blipFill rotWithShape="1">
-          <a:blip r:embed="rId6">
+          <a:blip r:embed="rId6" cstate="print">
             <a:extLst>
               <a:ext uri="{28A0092B-C50C-407E-A947-70E740481C1C}">
-                <a14:useLocalDpi xmlns:a14="http://schemas.microsoft.com/office/drawing/2010/main" val="0"/>
+                <a14:useLocalDpi xmlns:a14="http://schemas.microsoft.com/office/drawing/2010/main"/>
               </a:ext>
             </a:extLst>
           </a:blip>
-          <a:srcRect l="1820" t="8032" r="85779" b="6291"/>
+          <a:srcRect/>
           <a:stretch/>
         </p:blipFill>
         <p:spPr bwMode="auto">
@@ -13817,10 +13817,10 @@
           <p:nvPr/>
         </p:nvPicPr>
         <p:blipFill rotWithShape="1">
-          <a:blip r:embed="rId7">
+          <a:blip r:embed="rId7" cstate="print">
             <a:extLst>
               <a:ext uri="{28A0092B-C50C-407E-A947-70E740481C1C}">
-                <a14:useLocalDpi xmlns:a14="http://schemas.microsoft.com/office/drawing/2010/main" val="0"/>
+                <a14:useLocalDpi xmlns:a14="http://schemas.microsoft.com/office/drawing/2010/main"/>
               </a:ext>
             </a:extLst>
           </a:blip>
@@ -13930,10 +13930,10 @@
             <p:nvPr/>
           </p:nvPicPr>
           <p:blipFill rotWithShape="1">
-            <a:blip r:embed="rId7">
+            <a:blip r:embed="rId7" cstate="print">
               <a:extLst>
                 <a:ext uri="{28A0092B-C50C-407E-A947-70E740481C1C}">
-                  <a14:useLocalDpi xmlns:a14="http://schemas.microsoft.com/office/drawing/2010/main" val="0"/>
+                  <a14:useLocalDpi xmlns:a14="http://schemas.microsoft.com/office/drawing/2010/main"/>
                 </a:ext>
               </a:extLst>
             </a:blip>
@@ -13975,7 +13975,7 @@
             <p:nvPr/>
           </p:nvPicPr>
           <p:blipFill>
-            <a:blip r:embed="rId4">
+            <a:blip r:embed="rId4" cstate="print">
               <a:duotone>
                 <a:prstClr val="black"/>
                 <a:srgbClr val="D9C3A5">
@@ -13994,7 +13994,7 @@
                   </a14:imgProps>
                 </a:ext>
                 <a:ext uri="{28A0092B-C50C-407E-A947-70E740481C1C}">
-                  <a14:useLocalDpi xmlns:a14="http://schemas.microsoft.com/office/drawing/2010/main" val="0"/>
+                  <a14:useLocalDpi xmlns:a14="http://schemas.microsoft.com/office/drawing/2010/main"/>
                 </a:ext>
               </a:extLst>
             </a:blip>
@@ -14038,14 +14038,14 @@
             <p:nvPr/>
           </p:nvPicPr>
           <p:blipFill rotWithShape="1">
-            <a:blip r:embed="rId6">
+            <a:blip r:embed="rId6" cstate="print">
               <a:extLst>
                 <a:ext uri="{28A0092B-C50C-407E-A947-70E740481C1C}">
-                  <a14:useLocalDpi xmlns:a14="http://schemas.microsoft.com/office/drawing/2010/main" val="0"/>
+                  <a14:useLocalDpi xmlns:a14="http://schemas.microsoft.com/office/drawing/2010/main"/>
                 </a:ext>
               </a:extLst>
             </a:blip>
-            <a:srcRect l="1820" t="8032" r="85779" b="6291"/>
+            <a:srcRect/>
             <a:stretch/>
           </p:blipFill>
           <p:spPr bwMode="auto">
@@ -14205,10 +14205,10 @@
             <p:nvPr/>
           </p:nvPicPr>
           <p:blipFill rotWithShape="1">
-            <a:blip r:embed="rId7">
+            <a:blip r:embed="rId7" cstate="print">
               <a:extLst>
                 <a:ext uri="{28A0092B-C50C-407E-A947-70E740481C1C}">
-                  <a14:useLocalDpi xmlns:a14="http://schemas.microsoft.com/office/drawing/2010/main" val="0"/>
+                  <a14:useLocalDpi xmlns:a14="http://schemas.microsoft.com/office/drawing/2010/main"/>
                 </a:ext>
               </a:extLst>
             </a:blip>
@@ -14250,7 +14250,7 @@
             <p:nvPr/>
           </p:nvPicPr>
           <p:blipFill>
-            <a:blip r:embed="rId4">
+            <a:blip r:embed="rId4" cstate="print">
               <a:duotone>
                 <a:prstClr val="black"/>
                 <a:srgbClr val="D9C3A5">
@@ -14269,7 +14269,7 @@
                   </a14:imgProps>
                 </a:ext>
                 <a:ext uri="{28A0092B-C50C-407E-A947-70E740481C1C}">
-                  <a14:useLocalDpi xmlns:a14="http://schemas.microsoft.com/office/drawing/2010/main" val="0"/>
+                  <a14:useLocalDpi xmlns:a14="http://schemas.microsoft.com/office/drawing/2010/main"/>
                 </a:ext>
               </a:extLst>
             </a:blip>
@@ -14313,14 +14313,14 @@
             <p:nvPr/>
           </p:nvPicPr>
           <p:blipFill rotWithShape="1">
-            <a:blip r:embed="rId6">
+            <a:blip r:embed="rId6" cstate="print">
               <a:extLst>
                 <a:ext uri="{28A0092B-C50C-407E-A947-70E740481C1C}">
-                  <a14:useLocalDpi xmlns:a14="http://schemas.microsoft.com/office/drawing/2010/main" val="0"/>
+                  <a14:useLocalDpi xmlns:a14="http://schemas.microsoft.com/office/drawing/2010/main"/>
                 </a:ext>
               </a:extLst>
             </a:blip>
-            <a:srcRect l="1820" t="8032" r="85779" b="6291"/>
+            <a:srcRect/>
             <a:stretch/>
           </p:blipFill>
           <p:spPr bwMode="auto">
@@ -14443,14 +14443,14 @@
           <p:nvPr/>
         </p:nvPicPr>
         <p:blipFill rotWithShape="1">
-          <a:blip r:embed="rId3">
+          <a:blip r:embed="rId3" cstate="print">
             <a:extLst>
               <a:ext uri="{28A0092B-C50C-407E-A947-70E740481C1C}">
-                <a14:useLocalDpi xmlns:a14="http://schemas.microsoft.com/office/drawing/2010/main" val="0"/>
+                <a14:useLocalDpi xmlns:a14="http://schemas.microsoft.com/office/drawing/2010/main"/>
               </a:ext>
             </a:extLst>
           </a:blip>
-          <a:srcRect l="5625" r="7555"/>
+          <a:srcRect/>
           <a:stretch/>
         </p:blipFill>
         <p:spPr bwMode="auto">
@@ -14488,7 +14488,7 @@
           <p:nvPr/>
         </p:nvPicPr>
         <p:blipFill>
-          <a:blip r:embed="rId4">
+          <a:blip r:embed="rId4" cstate="print">
             <a:duotone>
               <a:prstClr val="black"/>
               <a:srgbClr val="D9C3A5">
@@ -14507,7 +14507,7 @@
                 </a14:imgProps>
               </a:ext>
               <a:ext uri="{28A0092B-C50C-407E-A947-70E740481C1C}">
-                <a14:useLocalDpi xmlns:a14="http://schemas.microsoft.com/office/drawing/2010/main" val="0"/>
+                <a14:useLocalDpi xmlns:a14="http://schemas.microsoft.com/office/drawing/2010/main"/>
               </a:ext>
             </a:extLst>
           </a:blip>
@@ -14612,14 +14612,14 @@
           <p:nvPr/>
         </p:nvPicPr>
         <p:blipFill rotWithShape="1">
-          <a:blip r:embed="rId6">
+          <a:blip r:embed="rId6" cstate="print">
             <a:extLst>
               <a:ext uri="{28A0092B-C50C-407E-A947-70E740481C1C}">
-                <a14:useLocalDpi xmlns:a14="http://schemas.microsoft.com/office/drawing/2010/main" val="0"/>
+                <a14:useLocalDpi xmlns:a14="http://schemas.microsoft.com/office/drawing/2010/main"/>
               </a:ext>
             </a:extLst>
           </a:blip>
-          <a:srcRect l="1820" t="8032" r="85779" b="6291"/>
+          <a:srcRect/>
           <a:stretch/>
         </p:blipFill>
         <p:spPr bwMode="auto">
@@ -14759,10 +14759,10 @@
           <p:nvPr/>
         </p:nvPicPr>
         <p:blipFill rotWithShape="1">
-          <a:blip r:embed="rId7">
+          <a:blip r:embed="rId7" cstate="print">
             <a:extLst>
               <a:ext uri="{28A0092B-C50C-407E-A947-70E740481C1C}">
-                <a14:useLocalDpi xmlns:a14="http://schemas.microsoft.com/office/drawing/2010/main" val="0"/>
+                <a14:useLocalDpi xmlns:a14="http://schemas.microsoft.com/office/drawing/2010/main"/>
               </a:ext>
             </a:extLst>
           </a:blip>
@@ -14804,7 +14804,7 @@
           <p:nvPr/>
         </p:nvPicPr>
         <p:blipFill>
-          <a:blip r:embed="rId4">
+          <a:blip r:embed="rId4" cstate="print">
             <a:duotone>
               <a:prstClr val="black"/>
               <a:srgbClr val="D9C3A5">
@@ -14823,7 +14823,7 @@
                 </a14:imgProps>
               </a:ext>
               <a:ext uri="{28A0092B-C50C-407E-A947-70E740481C1C}">
-                <a14:useLocalDpi xmlns:a14="http://schemas.microsoft.com/office/drawing/2010/main" val="0"/>
+                <a14:useLocalDpi xmlns:a14="http://schemas.microsoft.com/office/drawing/2010/main"/>
               </a:ext>
             </a:extLst>
           </a:blip>
@@ -14867,14 +14867,14 @@
           <p:nvPr/>
         </p:nvPicPr>
         <p:blipFill rotWithShape="1">
-          <a:blip r:embed="rId6">
+          <a:blip r:embed="rId6" cstate="print">
             <a:extLst>
               <a:ext uri="{28A0092B-C50C-407E-A947-70E740481C1C}">
-                <a14:useLocalDpi xmlns:a14="http://schemas.microsoft.com/office/drawing/2010/main" val="0"/>
+                <a14:useLocalDpi xmlns:a14="http://schemas.microsoft.com/office/drawing/2010/main"/>
               </a:ext>
             </a:extLst>
           </a:blip>
-          <a:srcRect l="1820" t="8032" r="85779" b="6291"/>
+          <a:srcRect/>
           <a:stretch/>
         </p:blipFill>
         <p:spPr bwMode="auto">
@@ -15034,10 +15034,10 @@
             <p:nvPr/>
           </p:nvPicPr>
           <p:blipFill rotWithShape="1">
-            <a:blip r:embed="rId7">
+            <a:blip r:embed="rId7" cstate="print">
               <a:extLst>
                 <a:ext uri="{28A0092B-C50C-407E-A947-70E740481C1C}">
-                  <a14:useLocalDpi xmlns:a14="http://schemas.microsoft.com/office/drawing/2010/main" val="0"/>
+                  <a14:useLocalDpi xmlns:a14="http://schemas.microsoft.com/office/drawing/2010/main"/>
                 </a:ext>
               </a:extLst>
             </a:blip>
@@ -15079,7 +15079,7 @@
             <p:nvPr/>
           </p:nvPicPr>
           <p:blipFill>
-            <a:blip r:embed="rId4">
+            <a:blip r:embed="rId4" cstate="print">
               <a:duotone>
                 <a:prstClr val="black"/>
                 <a:srgbClr val="D9C3A5">
@@ -15098,7 +15098,7 @@
                   </a14:imgProps>
                 </a:ext>
                 <a:ext uri="{28A0092B-C50C-407E-A947-70E740481C1C}">
-                  <a14:useLocalDpi xmlns:a14="http://schemas.microsoft.com/office/drawing/2010/main" val="0"/>
+                  <a14:useLocalDpi xmlns:a14="http://schemas.microsoft.com/office/drawing/2010/main"/>
                 </a:ext>
               </a:extLst>
             </a:blip>
@@ -15142,14 +15142,14 @@
             <p:nvPr/>
           </p:nvPicPr>
           <p:blipFill rotWithShape="1">
-            <a:blip r:embed="rId6">
+            <a:blip r:embed="rId6" cstate="print">
               <a:extLst>
                 <a:ext uri="{28A0092B-C50C-407E-A947-70E740481C1C}">
-                  <a14:useLocalDpi xmlns:a14="http://schemas.microsoft.com/office/drawing/2010/main" val="0"/>
+                  <a14:useLocalDpi xmlns:a14="http://schemas.microsoft.com/office/drawing/2010/main"/>
                 </a:ext>
               </a:extLst>
             </a:blip>
-            <a:srcRect l="1820" t="8032" r="85779" b="6291"/>
+            <a:srcRect/>
             <a:stretch/>
           </p:blipFill>
           <p:spPr bwMode="auto">
@@ -15309,10 +15309,10 @@
             <p:nvPr/>
           </p:nvPicPr>
           <p:blipFill rotWithShape="1">
-            <a:blip r:embed="rId7">
+            <a:blip r:embed="rId7" cstate="print">
               <a:extLst>
                 <a:ext uri="{28A0092B-C50C-407E-A947-70E740481C1C}">
-                  <a14:useLocalDpi xmlns:a14="http://schemas.microsoft.com/office/drawing/2010/main" val="0"/>
+                  <a14:useLocalDpi xmlns:a14="http://schemas.microsoft.com/office/drawing/2010/main"/>
                 </a:ext>
               </a:extLst>
             </a:blip>
@@ -15354,7 +15354,7 @@
             <p:nvPr/>
           </p:nvPicPr>
           <p:blipFill>
-            <a:blip r:embed="rId4">
+            <a:blip r:embed="rId4" cstate="print">
               <a:duotone>
                 <a:prstClr val="black"/>
                 <a:srgbClr val="D9C3A5">
@@ -15373,7 +15373,7 @@
                   </a14:imgProps>
                 </a:ext>
                 <a:ext uri="{28A0092B-C50C-407E-A947-70E740481C1C}">
-                  <a14:useLocalDpi xmlns:a14="http://schemas.microsoft.com/office/drawing/2010/main" val="0"/>
+                  <a14:useLocalDpi xmlns:a14="http://schemas.microsoft.com/office/drawing/2010/main"/>
                 </a:ext>
               </a:extLst>
             </a:blip>
@@ -15417,14 +15417,14 @@
             <p:nvPr/>
           </p:nvPicPr>
           <p:blipFill rotWithShape="1">
-            <a:blip r:embed="rId6">
+            <a:blip r:embed="rId6" cstate="print">
               <a:extLst>
                 <a:ext uri="{28A0092B-C50C-407E-A947-70E740481C1C}">
-                  <a14:useLocalDpi xmlns:a14="http://schemas.microsoft.com/office/drawing/2010/main" val="0"/>
+                  <a14:useLocalDpi xmlns:a14="http://schemas.microsoft.com/office/drawing/2010/main"/>
                 </a:ext>
               </a:extLst>
             </a:blip>
-            <a:srcRect l="1820" t="8032" r="85779" b="6291"/>
+            <a:srcRect/>
             <a:stretch/>
           </p:blipFill>
           <p:spPr bwMode="auto">

</xml_diff>